<commit_message>
Adjust syllabus and renumber tasks
</commit_message>
<xml_diff>
--- a/slides/Session 02 - Arrays and Algorithms/Session 02 - Arrays and Algorithms.pptx
+++ b/slides/Session 02 - Arrays and Algorithms/Session 02 - Arrays and Algorithms.pptx
@@ -293,7 +293,7 @@
           <a:p>
             <a:fld id="{A241AC98-512A-4A35-865E-757B6C1F07A2}" type="datetimeFigureOut">
               <a:rPr lang="en-US" smtClean="0"/>
-              <a:t>11/6/2022</a:t>
+              <a:t>12/13/2022</a:t>
             </a:fld>
             <a:endParaRPr lang="en-US"/>
           </a:p>
@@ -459,7 +459,7 @@
           <a:p>
             <a:fld id="{3854CEE7-15DE-41D9-8CA2-D1E137B1D850}" type="datetimeFigureOut">
               <a:rPr lang="en-US" smtClean="0"/>
-              <a:t>11/6/2022</a:t>
+              <a:t>12/13/2022</a:t>
             </a:fld>
             <a:endParaRPr lang="en-US"/>
           </a:p>
@@ -1866,7 +1866,7 @@
           <a:p>
             <a:fld id="{5555EB2C-244D-4423-AD97-018ED6478B87}" type="datetime1">
               <a:rPr lang="en-US" smtClean="0"/>
-              <a:t>11/6/2022</a:t>
+              <a:t>12/13/2022</a:t>
             </a:fld>
             <a:endParaRPr lang="en-US"/>
           </a:p>
@@ -2045,7 +2045,7 @@
           <a:p>
             <a:fld id="{A2B41D1F-7576-4C60-B4EB-5115BC56CF40}" type="datetime1">
               <a:rPr lang="en-US" smtClean="0"/>
-              <a:t>11/6/2022</a:t>
+              <a:t>12/13/2022</a:t>
             </a:fld>
             <a:endParaRPr lang="en-US"/>
           </a:p>
@@ -2237,7 +2237,7 @@
           <a:p>
             <a:fld id="{E79D1398-4D56-44F9-BA35-34ACF3159A64}" type="datetime1">
               <a:rPr lang="en-US" smtClean="0"/>
-              <a:t>11/6/2022</a:t>
+              <a:t>12/13/2022</a:t>
             </a:fld>
             <a:endParaRPr lang="en-US"/>
           </a:p>
@@ -2419,7 +2419,7 @@
           <a:p>
             <a:fld id="{A3CF632E-48CB-4EEB-A6B6-DEC7AD7CC976}" type="datetime1">
               <a:rPr lang="en-US" smtClean="0"/>
-              <a:t>11/6/2022</a:t>
+              <a:t>12/13/2022</a:t>
             </a:fld>
             <a:endParaRPr lang="en-US"/>
           </a:p>
@@ -2672,7 +2672,7 @@
           <a:p>
             <a:fld id="{BAEEE52C-3A57-458E-95F6-96B2FA9D1DD4}" type="datetime1">
               <a:rPr lang="en-US" smtClean="0"/>
-              <a:t>11/6/2022</a:t>
+              <a:t>12/13/2022</a:t>
             </a:fld>
             <a:endParaRPr lang="en-US"/>
           </a:p>
@@ -2916,7 +2916,7 @@
           <a:p>
             <a:fld id="{766FC747-A48A-4FF2-8EE4-3E95ECD1C2A8}" type="datetime1">
               <a:rPr lang="en-US" smtClean="0"/>
-              <a:t>11/6/2022</a:t>
+              <a:t>12/13/2022</a:t>
             </a:fld>
             <a:endParaRPr lang="en-US"/>
           </a:p>
@@ -3295,7 +3295,7 @@
           <a:p>
             <a:fld id="{C9BF5758-AB7F-463D-B638-E1729B95E126}" type="datetime1">
               <a:rPr lang="en-US" smtClean="0"/>
-              <a:t>11/6/2022</a:t>
+              <a:t>12/13/2022</a:t>
             </a:fld>
             <a:endParaRPr lang="en-US"/>
           </a:p>
@@ -3425,7 +3425,7 @@
           <a:p>
             <a:fld id="{F3718C77-7DD0-4738-BF52-D0EC9F78A76E}" type="datetime1">
               <a:rPr lang="en-US" smtClean="0"/>
-              <a:t>11/6/2022</a:t>
+              <a:t>12/13/2022</a:t>
             </a:fld>
             <a:endParaRPr lang="en-US"/>
           </a:p>
@@ -3532,7 +3532,7 @@
           <a:p>
             <a:fld id="{948970CF-13D9-4E1D-A74F-2CFE4953FCDB}" type="datetime1">
               <a:rPr lang="en-US" smtClean="0"/>
-              <a:t>11/6/2022</a:t>
+              <a:t>12/13/2022</a:t>
             </a:fld>
             <a:endParaRPr lang="en-US"/>
           </a:p>
@@ -3821,7 +3821,7 @@
           <a:p>
             <a:fld id="{F68C49B9-4E1C-4967-B9CF-0BF9FECBE837}" type="datetime1">
               <a:rPr lang="en-US" smtClean="0"/>
-              <a:t>11/6/2022</a:t>
+              <a:t>12/13/2022</a:t>
             </a:fld>
             <a:endParaRPr lang="en-US"/>
           </a:p>
@@ -4089,7 +4089,7 @@
           <a:p>
             <a:fld id="{7E338CBB-1F06-4333-9BBF-66628B15E581}" type="datetime1">
               <a:rPr lang="en-US" smtClean="0"/>
-              <a:t>11/6/2022</a:t>
+              <a:t>12/13/2022</a:t>
             </a:fld>
             <a:endParaRPr lang="en-US"/>
           </a:p>
@@ -4314,7 +4314,7 @@
           <a:p>
             <a:fld id="{705EC883-F03C-4CA3-AF62-BEF30EEA4F65}" type="datetime1">
               <a:rPr lang="en-US" smtClean="0"/>
-              <a:t>11/6/2022</a:t>
+              <a:t>12/13/2022</a:t>
             </a:fld>
             <a:endParaRPr lang="en-US"/>
           </a:p>
@@ -6151,8 +6151,8 @@
           </a:p>
         </p:txBody>
       </p:sp>
-      <mc:AlternateContent xmlns:mc="http://schemas.openxmlformats.org/markup-compatibility/2006">
-        <mc:Choice xmlns:a14="http://schemas.microsoft.com/office/drawing/2010/main" Requires="a14">
+      <mc:AlternateContent xmlns:mc="http://schemas.openxmlformats.org/markup-compatibility/2006" xmlns:a14="http://schemas.microsoft.com/office/drawing/2010/main">
+        <mc:Choice Requires="a14">
           <p:sp>
             <p:nvSpPr>
               <p:cNvPr id="3" name="Content Placeholder 2"/>
@@ -6290,16 +6290,7 @@
                             </a:solidFill>
                             <a:latin typeface="Cambria Math" panose="02040503050406030204" pitchFamily="18" charset="0"/>
                           </a:rPr>
-                          <m:t>𝑺</m:t>
-                        </m:r>
-                        <m:r>
-                          <a:rPr lang="en-US" sz="2400" b="1" i="1" smtClean="0">
-                            <a:solidFill>
-                              <a:srgbClr val="7030A0"/>
-                            </a:solidFill>
-                            <a:latin typeface="Cambria Math" panose="02040503050406030204" pitchFamily="18" charset="0"/>
-                          </a:rPr>
-                          <m:t>𝒊𝒈𝒎𝒂</m:t>
+                          <m:t>𝑺𝒊𝒈𝒎𝒂</m:t>
                         </m:r>
                         <m:r>
                           <a:rPr lang="en-US" sz="2400" b="0" i="1" smtClean="0">
@@ -6322,7 +6313,7 @@
             </p:txBody>
           </p:sp>
         </mc:Choice>
-        <mc:Fallback>
+        <mc:Fallback xmlns="">
           <p:sp>
             <p:nvSpPr>
               <p:cNvPr id="3" name="Content Placeholder 2"/>
@@ -6384,8 +6375,8 @@
           </a:p>
         </p:txBody>
       </p:sp>
-      <mc:AlternateContent xmlns:mc="http://schemas.openxmlformats.org/markup-compatibility/2006">
-        <mc:Choice xmlns:a14="http://schemas.microsoft.com/office/drawing/2010/main" Requires="a14">
+      <mc:AlternateContent xmlns:mc="http://schemas.openxmlformats.org/markup-compatibility/2006" xmlns:a14="http://schemas.microsoft.com/office/drawing/2010/main">
+        <mc:Choice Requires="a14">
           <p:sp>
             <p:nvSpPr>
               <p:cNvPr id="5" name="Rectangle 4">
@@ -6698,7 +6689,7 @@
             </p:txBody>
           </p:sp>
         </mc:Choice>
-        <mc:Fallback>
+        <mc:Fallback xmlns="">
           <p:sp>
             <p:nvSpPr>
               <p:cNvPr id="5" name="Rectangle 4">
@@ -15011,8 +15002,8 @@
           </a:p>
         </p:txBody>
       </p:sp>
-      <mc:AlternateContent xmlns:mc="http://schemas.openxmlformats.org/markup-compatibility/2006">
-        <mc:Choice xmlns:a14="http://schemas.microsoft.com/office/drawing/2010/main" Requires="a14">
+      <mc:AlternateContent xmlns:mc="http://schemas.openxmlformats.org/markup-compatibility/2006" xmlns:a14="http://schemas.microsoft.com/office/drawing/2010/main">
+        <mc:Choice Requires="a14">
           <p:sp>
             <p:nvSpPr>
               <p:cNvPr id="3" name="Content Placeholder 2"/>
@@ -15204,7 +15195,7 @@
             </p:txBody>
           </p:sp>
         </mc:Choice>
-        <mc:Fallback>
+        <mc:Fallback xmlns="">
           <p:sp>
             <p:nvSpPr>
               <p:cNvPr id="3" name="Content Placeholder 2"/>
@@ -21648,11 +21639,14 @@
           <a:p>
             <a:pPr algn="ctr"/>
             <a:r>
-              <a:rPr lang="en-US" sz="3200" b="1" dirty="0">
+              <a:rPr lang="en-US" sz="3200" b="1">
                 <a:latin typeface="+mn-lt"/>
               </a:rPr>
-              <a:t>Task 02-01</a:t>
-            </a:r>
+              <a:t>Task 02</a:t>
+            </a:r>
+            <a:endParaRPr lang="en-US" sz="3200" b="1" dirty="0">
+              <a:latin typeface="+mn-lt"/>
+            </a:endParaRPr>
           </a:p>
         </p:txBody>
       </p:sp>

</xml_diff>